<commit_message>
made changes in login , register  and footer page
</commit_message>
<xml_diff>
--- a/diagrams.pptx
+++ b/diagrams.pptx
@@ -264,7 +264,7 @@
           <a:p>
             <a:fld id="{753E1758-1876-4773-A025-6556E5A8363C}" type="datetimeFigureOut">
               <a:rPr lang="en-US" smtClean="0"/>
-              <a:t>8/5/2023</a:t>
+              <a:t>8/11/2023</a:t>
             </a:fld>
             <a:endParaRPr lang="en-US"/>
           </a:p>
@@ -462,7 +462,7 @@
           <a:p>
             <a:fld id="{753E1758-1876-4773-A025-6556E5A8363C}" type="datetimeFigureOut">
               <a:rPr lang="en-US" smtClean="0"/>
-              <a:t>8/5/2023</a:t>
+              <a:t>8/11/2023</a:t>
             </a:fld>
             <a:endParaRPr lang="en-US"/>
           </a:p>
@@ -670,7 +670,7 @@
           <a:p>
             <a:fld id="{753E1758-1876-4773-A025-6556E5A8363C}" type="datetimeFigureOut">
               <a:rPr lang="en-US" smtClean="0"/>
-              <a:t>8/5/2023</a:t>
+              <a:t>8/11/2023</a:t>
             </a:fld>
             <a:endParaRPr lang="en-US"/>
           </a:p>
@@ -868,7 +868,7 @@
           <a:p>
             <a:fld id="{753E1758-1876-4773-A025-6556E5A8363C}" type="datetimeFigureOut">
               <a:rPr lang="en-US" smtClean="0"/>
-              <a:t>8/5/2023</a:t>
+              <a:t>8/11/2023</a:t>
             </a:fld>
             <a:endParaRPr lang="en-US"/>
           </a:p>
@@ -1143,7 +1143,7 @@
           <a:p>
             <a:fld id="{753E1758-1876-4773-A025-6556E5A8363C}" type="datetimeFigureOut">
               <a:rPr lang="en-US" smtClean="0"/>
-              <a:t>8/5/2023</a:t>
+              <a:t>8/11/2023</a:t>
             </a:fld>
             <a:endParaRPr lang="en-US"/>
           </a:p>
@@ -1408,7 +1408,7 @@
           <a:p>
             <a:fld id="{753E1758-1876-4773-A025-6556E5A8363C}" type="datetimeFigureOut">
               <a:rPr lang="en-US" smtClean="0"/>
-              <a:t>8/5/2023</a:t>
+              <a:t>8/11/2023</a:t>
             </a:fld>
             <a:endParaRPr lang="en-US"/>
           </a:p>
@@ -1820,7 +1820,7 @@
           <a:p>
             <a:fld id="{753E1758-1876-4773-A025-6556E5A8363C}" type="datetimeFigureOut">
               <a:rPr lang="en-US" smtClean="0"/>
-              <a:t>8/5/2023</a:t>
+              <a:t>8/11/2023</a:t>
             </a:fld>
             <a:endParaRPr lang="en-US"/>
           </a:p>
@@ -1961,7 +1961,7 @@
           <a:p>
             <a:fld id="{753E1758-1876-4773-A025-6556E5A8363C}" type="datetimeFigureOut">
               <a:rPr lang="en-US" smtClean="0"/>
-              <a:t>8/5/2023</a:t>
+              <a:t>8/11/2023</a:t>
             </a:fld>
             <a:endParaRPr lang="en-US"/>
           </a:p>
@@ -2074,7 +2074,7 @@
           <a:p>
             <a:fld id="{753E1758-1876-4773-A025-6556E5A8363C}" type="datetimeFigureOut">
               <a:rPr lang="en-US" smtClean="0"/>
-              <a:t>8/5/2023</a:t>
+              <a:t>8/11/2023</a:t>
             </a:fld>
             <a:endParaRPr lang="en-US"/>
           </a:p>
@@ -2385,7 +2385,7 @@
           <a:p>
             <a:fld id="{753E1758-1876-4773-A025-6556E5A8363C}" type="datetimeFigureOut">
               <a:rPr lang="en-US" smtClean="0"/>
-              <a:t>8/5/2023</a:t>
+              <a:t>8/11/2023</a:t>
             </a:fld>
             <a:endParaRPr lang="en-US"/>
           </a:p>
@@ -2673,7 +2673,7 @@
           <a:p>
             <a:fld id="{753E1758-1876-4773-A025-6556E5A8363C}" type="datetimeFigureOut">
               <a:rPr lang="en-US" smtClean="0"/>
-              <a:t>8/5/2023</a:t>
+              <a:t>8/11/2023</a:t>
             </a:fld>
             <a:endParaRPr lang="en-US"/>
           </a:p>
@@ -2914,7 +2914,7 @@
           <a:p>
             <a:fld id="{753E1758-1876-4773-A025-6556E5A8363C}" type="datetimeFigureOut">
               <a:rPr lang="en-US" smtClean="0"/>
-              <a:t>8/5/2023</a:t>
+              <a:t>8/11/2023</a:t>
             </a:fld>
             <a:endParaRPr lang="en-US"/>
           </a:p>
@@ -3388,14 +3388,14 @@
         </p:spPr>
         <p:txBody>
           <a:bodyPr>
-            <a:normAutofit lnSpcReduction="10000"/>
+            <a:normAutofit fontScale="92500" lnSpcReduction="20000"/>
           </a:bodyPr>
           <a:lstStyle/>
           <a:p>
             <a:r>
               <a:rPr lang="en-US" dirty="0">
                 <a:solidFill>
-                  <a:srgbClr val="FF0000"/>
+                  <a:srgbClr val="92D050"/>
                 </a:solidFill>
               </a:rPr>
               <a:t>View Item(Harshit)</a:t>
@@ -3405,7 +3405,7 @@
             <a:r>
               <a:rPr lang="en-US" dirty="0">
                 <a:solidFill>
-                  <a:srgbClr val="FF0000"/>
+                  <a:srgbClr val="92D050"/>
                 </a:solidFill>
               </a:rPr>
               <a:t>Cart (Harshit)</a:t>
@@ -3415,7 +3415,7 @@
             <a:r>
               <a:rPr lang="en-US" dirty="0" err="1">
                 <a:solidFill>
-                  <a:srgbClr val="FF0000"/>
+                  <a:srgbClr val="92D050"/>
                 </a:solidFill>
               </a:rPr>
               <a:t>NavBar</a:t>
@@ -3423,7 +3423,7 @@
             <a:r>
               <a:rPr lang="en-US" dirty="0">
                 <a:solidFill>
-                  <a:srgbClr val="FF0000"/>
+                  <a:srgbClr val="92D050"/>
                 </a:solidFill>
               </a:rPr>
               <a:t>(Sagar)</a:t>
@@ -3433,7 +3433,7 @@
             <a:r>
               <a:rPr lang="en-US" dirty="0">
                 <a:solidFill>
-                  <a:srgbClr val="FF0000"/>
+                  <a:srgbClr val="92D050"/>
                 </a:solidFill>
               </a:rPr>
               <a:t>Footer(Sagar)</a:t>
@@ -3451,9 +3451,27 @@
           </a:p>
           <a:p>
             <a:r>
+              <a:rPr lang="en-US">
+                <a:solidFill>
+                  <a:srgbClr val="FF0000"/>
+                </a:solidFill>
+              </a:rPr>
+              <a:t>Home content(</a:t>
+            </a:r>
+            <a:r>
               <a:rPr lang="en-US" dirty="0">
                 <a:solidFill>
                   <a:srgbClr val="FF0000"/>
+                </a:solidFill>
+              </a:rPr>
+              <a:t>Sagar)</a:t>
+            </a:r>
+          </a:p>
+          <a:p>
+            <a:r>
+              <a:rPr lang="en-US" dirty="0">
+                <a:solidFill>
+                  <a:srgbClr val="92D050"/>
                 </a:solidFill>
               </a:rPr>
               <a:t>Log in / Register(Chinmay)</a:t>
@@ -3483,7 +3501,7 @@
             <a:r>
               <a:rPr lang="en-US" dirty="0">
                 <a:solidFill>
-                  <a:srgbClr val="FF0000"/>
+                  <a:srgbClr val="92D050"/>
                 </a:solidFill>
               </a:rPr>
               <a:t>Sell(Yashasvi)</a:t>

</xml_diff>